<commit_message>
Updated Exercise-05 as per the review suggestions.
</commit_message>
<xml_diff>
--- a/projects/03-design-for-security/Exercise_5/DevSecOpsPipeline.pptx
+++ b/projects/03-design-for-security/Exercise_5/DevSecOpsPipeline.pptx
@@ -5579,7 +5579,7 @@
         </p:nvSpPr>
         <p:spPr>
           <a:xfrm>
-            <a:off x="2441363" y="1041365"/>
+            <a:off x="2441363" y="1774233"/>
             <a:ext cx="1308000" cy="597600"/>
           </a:xfrm>
           <a:prstGeom prst="rect">
@@ -5625,7 +5625,7 @@
         </p:nvSpPr>
         <p:spPr>
           <a:xfrm>
-            <a:off x="6805175" y="2111425"/>
+            <a:off x="6805175" y="2844293"/>
             <a:ext cx="1666500" cy="597600"/>
           </a:xfrm>
           <a:prstGeom prst="rect">
@@ -5671,7 +5671,7 @@
         </p:nvSpPr>
         <p:spPr>
           <a:xfrm>
-            <a:off x="4623263" y="2111425"/>
+            <a:off x="4623263" y="2844293"/>
             <a:ext cx="1308000" cy="597600"/>
           </a:xfrm>
           <a:prstGeom prst="rect">
@@ -5717,7 +5717,7 @@
         </p:nvSpPr>
         <p:spPr>
           <a:xfrm>
-            <a:off x="298375" y="504340"/>
+            <a:off x="298375" y="1237208"/>
             <a:ext cx="1308000" cy="597600"/>
           </a:xfrm>
           <a:prstGeom prst="rect">
@@ -5748,10 +5748,10 @@
               <a:buNone/>
             </a:pPr>
             <a:r>
-              <a:rPr lang="en" sz="1000"/>
+              <a:rPr lang="en" sz="1000" dirty="0"/>
               <a:t>Application code or OS change</a:t>
             </a:r>
-            <a:endParaRPr sz="1000"/>
+            <a:endParaRPr sz="1000" dirty="0"/>
           </a:p>
         </p:txBody>
       </p:sp>
@@ -5763,7 +5763,7 @@
         </p:nvSpPr>
         <p:spPr>
           <a:xfrm>
-            <a:off x="298375" y="2775583"/>
+            <a:off x="298375" y="3508451"/>
             <a:ext cx="1308000" cy="597600"/>
           </a:xfrm>
           <a:prstGeom prst="rect">
@@ -5812,7 +5812,7 @@
         </p:nvCxnSpPr>
         <p:spPr>
           <a:xfrm>
-            <a:off x="1606375" y="803140"/>
+            <a:off x="1606375" y="1536008"/>
             <a:ext cx="1488900" cy="238200"/>
           </a:xfrm>
           <a:prstGeom prst="bentConnector2">
@@ -5842,7 +5842,7 @@
         </p:nvCxnSpPr>
         <p:spPr>
           <a:xfrm>
-            <a:off x="3749363" y="1340165"/>
+            <a:off x="3749363" y="2073033"/>
             <a:ext cx="873900" cy="5629"/>
           </a:xfrm>
           <a:prstGeom prst="bentConnector3">
@@ -5873,7 +5873,7 @@
         </p:nvCxnSpPr>
         <p:spPr>
           <a:xfrm>
-            <a:off x="5931263" y="2410225"/>
+            <a:off x="5931263" y="3143093"/>
             <a:ext cx="873900" cy="600"/>
           </a:xfrm>
           <a:prstGeom prst="bentConnector3">
@@ -5907,7 +5907,7 @@
         </p:nvSpPr>
         <p:spPr>
           <a:xfrm>
-            <a:off x="4623263" y="1046994"/>
+            <a:off x="4623263" y="1779862"/>
             <a:ext cx="1308000" cy="597600"/>
           </a:xfrm>
           <a:prstGeom prst="rect">
@@ -6014,7 +6014,7 @@
         </p:nvCxnSpPr>
         <p:spPr>
           <a:xfrm rot="5400000">
-            <a:off x="5043848" y="1878009"/>
+            <a:off x="5043848" y="2610877"/>
             <a:ext cx="466831" cy="12700"/>
           </a:xfrm>
           <a:prstGeom prst="bentConnector3">
@@ -6048,7 +6048,7 @@
         </p:nvSpPr>
         <p:spPr>
           <a:xfrm>
-            <a:off x="6805163" y="3269900"/>
+            <a:off x="6805163" y="4002768"/>
             <a:ext cx="1666500" cy="597600"/>
           </a:xfrm>
           <a:prstGeom prst="rect">
@@ -6141,7 +6141,7 @@
         </p:nvCxnSpPr>
         <p:spPr>
           <a:xfrm rot="5400000">
-            <a:off x="7357982" y="2989456"/>
+            <a:off x="7357982" y="3722324"/>
             <a:ext cx="560875" cy="12"/>
           </a:xfrm>
           <a:prstGeom prst="bentConnector3">
@@ -6175,7 +6175,7 @@
         </p:nvSpPr>
         <p:spPr>
           <a:xfrm>
-            <a:off x="2390703" y="2796382"/>
+            <a:off x="2390703" y="3508451"/>
             <a:ext cx="1398441" cy="597600"/>
           </a:xfrm>
           <a:prstGeom prst="rect">
@@ -6265,8 +6265,8 @@
         </p:nvCxnSpPr>
         <p:spPr>
           <a:xfrm>
-            <a:off x="1606375" y="3074383"/>
-            <a:ext cx="784328" cy="20799"/>
+            <a:off x="1606375" y="3807251"/>
+            <a:ext cx="784328" cy="12700"/>
           </a:xfrm>
           <a:prstGeom prst="bentConnector3">
             <a:avLst>
@@ -6302,8 +6302,247 @@
         </p:nvCxnSpPr>
         <p:spPr>
           <a:xfrm flipV="1">
-            <a:off x="3749264" y="2709025"/>
+            <a:off x="3749264" y="3441893"/>
             <a:ext cx="1527999" cy="416716"/>
+          </a:xfrm>
+          <a:prstGeom prst="bentConnector2">
+            <a:avLst/>
+          </a:prstGeom>
+          <a:noFill/>
+          <a:ln w="3175" cap="flat" cmpd="sng">
+            <a:solidFill>
+              <a:schemeClr val="dk2"/>
+            </a:solidFill>
+            <a:prstDash val="solid"/>
+            <a:round/>
+            <a:headEnd type="none" w="med" len="med"/>
+            <a:tailEnd type="triangle" w="med" len="med"/>
+          </a:ln>
+        </p:spPr>
+      </p:cxnSp>
+      <p:sp>
+        <p:nvSpPr>
+          <p:cNvPr id="19" name="Google Shape;54;p13">
+            <a:extLst>
+              <a:ext uri="{FF2B5EF4-FFF2-40B4-BE49-F238E27FC236}">
+                <a16:creationId xmlns:a16="http://schemas.microsoft.com/office/drawing/2014/main" id="{775C2AFA-B2FC-49E6-AFE8-822176CB6ECB}"/>
+              </a:ext>
+            </a:extLst>
+          </p:cNvPr>
+          <p:cNvSpPr/>
+          <p:nvPr/>
+        </p:nvSpPr>
+        <p:spPr>
+          <a:xfrm>
+            <a:off x="4629614" y="555588"/>
+            <a:ext cx="1308000" cy="597600"/>
+          </a:xfrm>
+          <a:prstGeom prst="rect">
+            <a:avLst/>
+          </a:prstGeom>
+          <a:solidFill>
+            <a:schemeClr val="accent6">
+              <a:lumMod val="60000"/>
+              <a:lumOff val="40000"/>
+            </a:schemeClr>
+          </a:solidFill>
+          <a:ln w="3175">
+            <a:solidFill>
+              <a:schemeClr val="tx1"/>
+            </a:solidFill>
+          </a:ln>
+        </p:spPr>
+        <p:style>
+          <a:lnRef idx="2">
+            <a:schemeClr val="accent1">
+              <a:shade val="50000"/>
+            </a:schemeClr>
+          </a:lnRef>
+          <a:fillRef idx="1">
+            <a:schemeClr val="accent1"/>
+          </a:fillRef>
+          <a:effectRef idx="0">
+            <a:schemeClr val="accent1"/>
+          </a:effectRef>
+          <a:fontRef idx="minor">
+            <a:schemeClr val="lt1"/>
+          </a:fontRef>
+        </p:style>
+        <p:txBody>
+          <a:bodyPr rtlCol="0" anchor="ctr"/>
+          <a:lstStyle/>
+          <a:p>
+            <a:pPr algn="ctr"/>
+            <a:r>
+              <a:rPr lang="en-US" sz="900" dirty="0">
+                <a:solidFill>
+                  <a:schemeClr val="tx1"/>
+                </a:solidFill>
+              </a:rPr>
+              <a:t>Remediate </a:t>
+            </a:r>
+            <a:r>
+              <a:rPr lang="en-IE" sz="900" dirty="0">
+                <a:solidFill>
+                  <a:schemeClr val="tx1"/>
+                </a:solidFill>
+              </a:rPr>
+              <a:t>Issues,</a:t>
+            </a:r>
+          </a:p>
+          <a:p>
+            <a:pPr algn="ctr"/>
+            <a:r>
+              <a:rPr lang="en-IE" sz="900" dirty="0">
+                <a:solidFill>
+                  <a:schemeClr val="tx1"/>
+                </a:solidFill>
+                <a:latin typeface="+mn-lt"/>
+                <a:ea typeface="+mn-ea"/>
+                <a:cs typeface="+mn-cs"/>
+              </a:rPr>
+              <a:t>Publish the code</a:t>
+            </a:r>
+            <a:endParaRPr sz="900" dirty="0">
+              <a:solidFill>
+                <a:schemeClr val="tx1"/>
+              </a:solidFill>
+              <a:latin typeface="+mn-lt"/>
+              <a:ea typeface="+mn-ea"/>
+              <a:cs typeface="+mn-cs"/>
+            </a:endParaRPr>
+          </a:p>
+        </p:txBody>
+      </p:sp>
+      <p:sp>
+        <p:nvSpPr>
+          <p:cNvPr id="4" name="TextBox 3">
+            <a:extLst>
+              <a:ext uri="{FF2B5EF4-FFF2-40B4-BE49-F238E27FC236}">
+                <a16:creationId xmlns:a16="http://schemas.microsoft.com/office/drawing/2014/main" id="{D7E772CE-8821-4F35-B9EA-76037F64027A}"/>
+              </a:ext>
+            </a:extLst>
+          </p:cNvPr>
+          <p:cNvSpPr txBox="1"/>
+          <p:nvPr/>
+        </p:nvSpPr>
+        <p:spPr>
+          <a:xfrm>
+            <a:off x="5270914" y="2464061"/>
+            <a:ext cx="861200" cy="215444"/>
+          </a:xfrm>
+          <a:prstGeom prst="rect">
+            <a:avLst/>
+          </a:prstGeom>
+          <a:noFill/>
+        </p:spPr>
+        <p:txBody>
+          <a:bodyPr wrap="square" rtlCol="0">
+            <a:spAutoFit/>
+          </a:bodyPr>
+          <a:lstStyle/>
+          <a:p>
+            <a:r>
+              <a:rPr lang="en-US" sz="800" i="1" dirty="0"/>
+              <a:t>If successful</a:t>
+            </a:r>
+            <a:endParaRPr lang="en-IE" sz="800" i="1" dirty="0"/>
+          </a:p>
+        </p:txBody>
+      </p:sp>
+      <p:sp>
+        <p:nvSpPr>
+          <p:cNvPr id="23" name="TextBox 22">
+            <a:extLst>
+              <a:ext uri="{FF2B5EF4-FFF2-40B4-BE49-F238E27FC236}">
+                <a16:creationId xmlns:a16="http://schemas.microsoft.com/office/drawing/2014/main" id="{22501296-270D-4D38-9C0F-BC620BADB685}"/>
+              </a:ext>
+            </a:extLst>
+          </p:cNvPr>
+          <p:cNvSpPr txBox="1"/>
+          <p:nvPr/>
+        </p:nvSpPr>
+        <p:spPr>
+          <a:xfrm>
+            <a:off x="5342631" y="1355139"/>
+            <a:ext cx="861200" cy="338554"/>
+          </a:xfrm>
+          <a:prstGeom prst="rect">
+            <a:avLst/>
+          </a:prstGeom>
+          <a:noFill/>
+        </p:spPr>
+        <p:txBody>
+          <a:bodyPr wrap="square" rtlCol="0">
+            <a:spAutoFit/>
+          </a:bodyPr>
+          <a:lstStyle/>
+          <a:p>
+            <a:r>
+              <a:rPr lang="en-US" sz="800" i="1" dirty="0"/>
+              <a:t>Issues Identified</a:t>
+            </a:r>
+            <a:endParaRPr lang="en-IE" sz="800" i="1" dirty="0"/>
+          </a:p>
+        </p:txBody>
+      </p:sp>
+      <p:cxnSp>
+        <p:nvCxnSpPr>
+          <p:cNvPr id="24" name="Google Shape;61;p13">
+            <a:extLst>
+              <a:ext uri="{FF2B5EF4-FFF2-40B4-BE49-F238E27FC236}">
+                <a16:creationId xmlns:a16="http://schemas.microsoft.com/office/drawing/2014/main" id="{5E353676-5D84-4E11-88FF-F446E2274CCD}"/>
+              </a:ext>
+            </a:extLst>
+          </p:cNvPr>
+          <p:cNvCxnSpPr>
+            <a:cxnSpLocks/>
+            <a:stCxn id="11" idx="0"/>
+            <a:endCxn id="19" idx="2"/>
+          </p:cNvCxnSpPr>
+          <p:nvPr/>
+        </p:nvCxnSpPr>
+        <p:spPr>
+          <a:xfrm rot="5400000" flipH="1" flipV="1">
+            <a:off x="4967101" y="1463350"/>
+            <a:ext cx="626674" cy="6351"/>
+          </a:xfrm>
+          <a:prstGeom prst="bentConnector3">
+            <a:avLst>
+              <a:gd name="adj1" fmla="val 50000"/>
+            </a:avLst>
+          </a:prstGeom>
+          <a:noFill/>
+          <a:ln w="3175" cap="flat" cmpd="sng">
+            <a:solidFill>
+              <a:schemeClr val="dk2"/>
+            </a:solidFill>
+            <a:prstDash val="solid"/>
+            <a:round/>
+            <a:headEnd type="none" w="med" len="med"/>
+            <a:tailEnd type="triangle" w="med" len="med"/>
+          </a:ln>
+        </p:spPr>
+      </p:cxnSp>
+      <p:cxnSp>
+        <p:nvCxnSpPr>
+          <p:cNvPr id="25" name="Google Shape;61;p13">
+            <a:extLst>
+              <a:ext uri="{FF2B5EF4-FFF2-40B4-BE49-F238E27FC236}">
+                <a16:creationId xmlns:a16="http://schemas.microsoft.com/office/drawing/2014/main" id="{AB36C1BA-5EE6-4E39-8E6C-68A2440077AE}"/>
+              </a:ext>
+            </a:extLst>
+          </p:cNvPr>
+          <p:cNvCxnSpPr>
+            <a:cxnSpLocks/>
+            <a:endCxn id="57" idx="0"/>
+          </p:cNvCxnSpPr>
+          <p:nvPr/>
+        </p:nvCxnSpPr>
+        <p:spPr>
+          <a:xfrm rot="10800000" flipV="1">
+            <a:off x="952376" y="846596"/>
+            <a:ext cx="3670891" cy="390612"/>
           </a:xfrm>
           <a:prstGeom prst="bentConnector2">
             <a:avLst/>

</xml_diff>